<commit_message>
Fix Source Tree Installation Guide Typo
</commit_message>
<xml_diff>
--- a/Git 특강/Source Tree 설치법.pptx
+++ b/Git 특강/Source Tree 설치법.pptx
@@ -21,20 +21,24 @@
   <p:notesSz cx="6858000" cy="9144000"/>
   <p:embeddedFontLst>
     <p:embeddedFont>
-      <p:font typeface="나눔고딕 ExtraBold" panose="020D0904000000000000" pitchFamily="50" charset="-127"/>
+      <p:font typeface="나눔스퀘어 Bold" panose="020B0600000101010101" pitchFamily="50" charset="-127"/>
       <p:bold r:id="rId13"/>
     </p:embeddedFont>
     <p:embeddedFont>
+      <p:font typeface="나눔고딕 ExtraBold" panose="020D0904000000000000" pitchFamily="50" charset="-127"/>
+      <p:bold r:id="rId14"/>
+    </p:embeddedFont>
+    <p:embeddedFont>
       <p:font typeface="나눔스퀘어_ac" panose="020B0600000101010101" pitchFamily="50" charset="-127"/>
-      <p:regular r:id="rId14"/>
+      <p:regular r:id="rId15"/>
     </p:embeddedFont>
     <p:embeddedFont>
       <p:font typeface="나눔스퀘어_ac Bold" panose="020B0600000101010101" pitchFamily="50" charset="-127"/>
-      <p:bold r:id="rId15"/>
+      <p:bold r:id="rId16"/>
     </p:embeddedFont>
     <p:embeddedFont>
       <p:font typeface="나눔스퀘어_ac ExtraBold" panose="020B0600000101010101" pitchFamily="50" charset="-127"/>
-      <p:bold r:id="rId16"/>
+      <p:bold r:id="rId17"/>
     </p:embeddedFont>
   </p:embeddedFontLst>
   <p:defaultTextStyle>
@@ -298,7 +302,7 @@
           <a:p>
             <a:fld id="{1016FC29-B5FF-48FD-A177-5EC92022276A}" type="datetimeFigureOut">
               <a:rPr lang="ko-KR" altLang="en-US" smtClean="0"/>
-              <a:t>2020/4/7/Tuesday</a:t>
+              <a:t>2020/4/9/Thursday</a:t>
             </a:fld>
             <a:endParaRPr lang="ko-KR" altLang="en-US"/>
           </a:p>
@@ -496,7 +500,7 @@
           <a:p>
             <a:fld id="{1016FC29-B5FF-48FD-A177-5EC92022276A}" type="datetimeFigureOut">
               <a:rPr lang="ko-KR" altLang="en-US" smtClean="0"/>
-              <a:t>2020/4/7/Tuesday</a:t>
+              <a:t>2020/4/9/Thursday</a:t>
             </a:fld>
             <a:endParaRPr lang="ko-KR" altLang="en-US"/>
           </a:p>
@@ -704,7 +708,7 @@
           <a:p>
             <a:fld id="{1016FC29-B5FF-48FD-A177-5EC92022276A}" type="datetimeFigureOut">
               <a:rPr lang="ko-KR" altLang="en-US" smtClean="0"/>
-              <a:t>2020/4/7/Tuesday</a:t>
+              <a:t>2020/4/9/Thursday</a:t>
             </a:fld>
             <a:endParaRPr lang="ko-KR" altLang="en-US"/>
           </a:p>
@@ -912,7 +916,7 @@
           <a:p>
             <a:fld id="{1016FC29-B5FF-48FD-A177-5EC92022276A}" type="datetimeFigureOut">
               <a:rPr lang="ko-KR" altLang="en-US" smtClean="0"/>
-              <a:t>2020/4/7/Tuesday</a:t>
+              <a:t>2020/4/9/Thursday</a:t>
             </a:fld>
             <a:endParaRPr lang="ko-KR" altLang="en-US"/>
           </a:p>
@@ -1187,7 +1191,7 @@
           <a:p>
             <a:fld id="{1016FC29-B5FF-48FD-A177-5EC92022276A}" type="datetimeFigureOut">
               <a:rPr lang="ko-KR" altLang="en-US" smtClean="0"/>
-              <a:t>2020/4/7/Tuesday</a:t>
+              <a:t>2020/4/9/Thursday</a:t>
             </a:fld>
             <a:endParaRPr lang="ko-KR" altLang="en-US"/>
           </a:p>
@@ -1452,7 +1456,7 @@
           <a:p>
             <a:fld id="{1016FC29-B5FF-48FD-A177-5EC92022276A}" type="datetimeFigureOut">
               <a:rPr lang="ko-KR" altLang="en-US" smtClean="0"/>
-              <a:t>2020/4/7/Tuesday</a:t>
+              <a:t>2020/4/9/Thursday</a:t>
             </a:fld>
             <a:endParaRPr lang="ko-KR" altLang="en-US"/>
           </a:p>
@@ -1864,7 +1868,7 @@
           <a:p>
             <a:fld id="{1016FC29-B5FF-48FD-A177-5EC92022276A}" type="datetimeFigureOut">
               <a:rPr lang="ko-KR" altLang="en-US" smtClean="0"/>
-              <a:t>2020/4/7/Tuesday</a:t>
+              <a:t>2020/4/9/Thursday</a:t>
             </a:fld>
             <a:endParaRPr lang="ko-KR" altLang="en-US"/>
           </a:p>
@@ -2005,7 +2009,7 @@
           <a:p>
             <a:fld id="{1016FC29-B5FF-48FD-A177-5EC92022276A}" type="datetimeFigureOut">
               <a:rPr lang="ko-KR" altLang="en-US" smtClean="0"/>
-              <a:t>2020/4/7/Tuesday</a:t>
+              <a:t>2020/4/9/Thursday</a:t>
             </a:fld>
             <a:endParaRPr lang="ko-KR" altLang="en-US"/>
           </a:p>
@@ -2118,7 +2122,7 @@
           <a:p>
             <a:fld id="{1016FC29-B5FF-48FD-A177-5EC92022276A}" type="datetimeFigureOut">
               <a:rPr lang="ko-KR" altLang="en-US" smtClean="0"/>
-              <a:t>2020/4/7/Tuesday</a:t>
+              <a:t>2020/4/9/Thursday</a:t>
             </a:fld>
             <a:endParaRPr lang="ko-KR" altLang="en-US"/>
           </a:p>
@@ -2429,7 +2433,7 @@
           <a:p>
             <a:fld id="{1016FC29-B5FF-48FD-A177-5EC92022276A}" type="datetimeFigureOut">
               <a:rPr lang="ko-KR" altLang="en-US" smtClean="0"/>
-              <a:t>2020/4/7/Tuesday</a:t>
+              <a:t>2020/4/9/Thursday</a:t>
             </a:fld>
             <a:endParaRPr lang="ko-KR" altLang="en-US"/>
           </a:p>
@@ -2717,7 +2721,7 @@
           <a:p>
             <a:fld id="{1016FC29-B5FF-48FD-A177-5EC92022276A}" type="datetimeFigureOut">
               <a:rPr lang="ko-KR" altLang="en-US" smtClean="0"/>
-              <a:t>2020/4/7/Tuesday</a:t>
+              <a:t>2020/4/9/Thursday</a:t>
             </a:fld>
             <a:endParaRPr lang="ko-KR" altLang="en-US"/>
           </a:p>
@@ -2961,7 +2965,7 @@
             <a:fld id="{1016FC29-B5FF-48FD-A177-5EC92022276A}" type="datetimeFigureOut">
               <a:rPr lang="ko-KR" altLang="en-US" smtClean="0"/>
               <a:pPr/>
-              <a:t>2020/4/7/Tuesday</a:t>
+              <a:t>2020/4/9/Thursday</a:t>
             </a:fld>
             <a:endParaRPr lang="ko-KR" altLang="en-US" dirty="0"/>
           </a:p>
@@ -3439,6 +3443,44 @@
           </a:p>
         </p:txBody>
       </p:sp>
+      <p:sp>
+        <p:nvSpPr>
+          <p:cNvPr id="3" name="TextBox 2">
+            <a:extLst>
+              <a:ext uri="{FF2B5EF4-FFF2-40B4-BE49-F238E27FC236}">
+                <a16:creationId xmlns:a16="http://schemas.microsoft.com/office/drawing/2014/main" id="{BC9952CD-6F5E-4B9E-8CF5-5C305EF9328E}"/>
+              </a:ext>
+            </a:extLst>
+          </p:cNvPr>
+          <p:cNvSpPr txBox="1"/>
+          <p:nvPr/>
+        </p:nvSpPr>
+        <p:spPr>
+          <a:xfrm>
+            <a:off x="11162581" y="6331788"/>
+            <a:ext cx="897148" cy="369332"/>
+          </a:xfrm>
+          <a:prstGeom prst="rect">
+            <a:avLst/>
+          </a:prstGeom>
+          <a:noFill/>
+        </p:spPr>
+        <p:txBody>
+          <a:bodyPr wrap="square" rtlCol="0">
+            <a:spAutoFit/>
+          </a:bodyPr>
+          <a:lstStyle/>
+          <a:p>
+            <a:r>
+              <a:rPr lang="ko-KR" altLang="en-US" dirty="0">
+                <a:latin typeface="나눔스퀘어 Bold" panose="020B0600000101010101" pitchFamily="50" charset="-127"/>
+                <a:ea typeface="나눔스퀘어 Bold" panose="020B0600000101010101" pitchFamily="50" charset="-127"/>
+              </a:rPr>
+              <a:t>고주형</a:t>
+            </a:r>
+          </a:p>
+        </p:txBody>
+      </p:sp>
     </p:spTree>
     <p:extLst>
       <p:ext uri="{BB962C8B-B14F-4D97-AF65-F5344CB8AC3E}">
@@ -3529,17 +3571,14 @@
               </a:rPr>
               <a:t>우리는 사용하지 않을 겁니다</a:t>
             </a:r>
-            <a:r>
-              <a:rPr lang="en-US" altLang="ko-KR" dirty="0">
-                <a:solidFill>
-                  <a:schemeClr val="tx1">
-                    <a:lumMod val="65000"/>
-                    <a:lumOff val="35000"/>
-                  </a:schemeClr>
-                </a:solidFill>
-              </a:rPr>
-              <a:t>.</a:t>
-            </a:r>
+            <a:endParaRPr lang="en-US" altLang="ko-KR" dirty="0">
+              <a:solidFill>
+                <a:schemeClr val="tx1">
+                  <a:lumMod val="65000"/>
+                  <a:lumOff val="35000"/>
+                </a:schemeClr>
+              </a:solidFill>
+            </a:endParaRPr>
           </a:p>
           <a:p>
             <a:pPr lvl="1"/>
@@ -3766,7 +3805,7 @@
                   <a:schemeClr val="tx1"/>
                 </a:solidFill>
               </a:rPr>
-              <a:t>확인</a:t>
+              <a:t>끝</a:t>
             </a:r>
           </a:p>
         </p:txBody>
@@ -3795,7 +3834,7 @@
                   </a:schemeClr>
                 </a:solidFill>
               </a:rPr>
-              <a:t>이런 창이 나오면 성공</a:t>
+              <a:t>이런 창이 나오는지 확인합니다</a:t>
             </a:r>
           </a:p>
         </p:txBody>
@@ -4238,25 +4277,6 @@
               </a:rPr>
               <a:t>에 가입해야 합니다</a:t>
             </a:r>
-            <a:r>
-              <a:rPr lang="en-US" altLang="ko-KR" dirty="0">
-                <a:solidFill>
-                  <a:schemeClr val="tx1">
-                    <a:lumMod val="65000"/>
-                    <a:lumOff val="35000"/>
-                  </a:schemeClr>
-                </a:solidFill>
-              </a:rPr>
-              <a:t>.</a:t>
-            </a:r>
-            <a:endParaRPr lang="ko-KR" altLang="en-US" dirty="0">
-              <a:solidFill>
-                <a:schemeClr val="tx1">
-                  <a:lumMod val="65000"/>
-                  <a:lumOff val="35000"/>
-                </a:schemeClr>
-              </a:solidFill>
-            </a:endParaRPr>
           </a:p>
         </p:txBody>
       </p:sp>
@@ -4595,7 +4615,7 @@
                   </a:schemeClr>
                 </a:solidFill>
               </a:rPr>
-              <a:t>. </a:t>
+              <a:t>.</a:t>
             </a:r>
           </a:p>
           <a:p>
@@ -4610,8 +4630,19 @@
               </a:rPr>
               <a:t>가입한 아이디로 로그인합니다</a:t>
             </a:r>
-            <a:r>
-              <a:rPr lang="en-US" altLang="ko-KR" dirty="0">
+            <a:endParaRPr lang="en-US" altLang="ko-KR" dirty="0">
+              <a:solidFill>
+                <a:schemeClr val="tx1">
+                  <a:lumMod val="65000"/>
+                  <a:lumOff val="35000"/>
+                </a:schemeClr>
+              </a:solidFill>
+            </a:endParaRPr>
+          </a:p>
+          <a:p>
+            <a:pPr lvl="1"/>
+            <a:r>
+              <a:rPr lang="ko-KR" altLang="en-US" dirty="0">
                 <a:solidFill>
                   <a:schemeClr val="tx1">
                     <a:lumMod val="65000"/>
@@ -4619,13 +4650,10 @@
                   </a:schemeClr>
                 </a:solidFill>
               </a:rPr>
-              <a:t>.</a:t>
-            </a:r>
-          </a:p>
-          <a:p>
-            <a:pPr lvl="1"/>
-            <a:r>
-              <a:rPr lang="ko-KR" altLang="en-US" dirty="0">
+              <a:t>이미 로그인 되어 있다면 </a:t>
+            </a:r>
+            <a:r>
+              <a:rPr lang="en-US" altLang="ko-KR" dirty="0">
                 <a:solidFill>
                   <a:schemeClr val="tx1">
                     <a:lumMod val="65000"/>
@@ -4633,18 +4661,7 @@
                   </a:schemeClr>
                 </a:solidFill>
               </a:rPr>
-              <a:t>이미 로그인 되어 있다면 </a:t>
-            </a:r>
-            <a:r>
-              <a:rPr lang="en-US" altLang="ko-KR" dirty="0">
-                <a:solidFill>
-                  <a:schemeClr val="tx1">
-                    <a:lumMod val="65000"/>
-                    <a:lumOff val="35000"/>
-                  </a:schemeClr>
-                </a:solidFill>
-              </a:rPr>
-              <a:t>Skip.</a:t>
+              <a:t>Skip</a:t>
             </a:r>
             <a:endParaRPr lang="ko-KR" altLang="en-US" dirty="0">
               <a:solidFill>
@@ -4827,10 +4844,10 @@
                   </a:schemeClr>
                 </a:solidFill>
               </a:rPr>
-              <a:t>페이지로 이동할겁니다</a:t>
-            </a:r>
-            <a:r>
-              <a:rPr lang="en-US" altLang="ko-KR" dirty="0">
+              <a:t>페이지로 </a:t>
+            </a:r>
+            <a:r>
+              <a:rPr lang="ko-KR" altLang="en-US" dirty="0" err="1">
                 <a:solidFill>
                   <a:schemeClr val="tx1">
                     <a:lumMod val="65000"/>
@@ -4838,8 +4855,16 @@
                   </a:schemeClr>
                 </a:solidFill>
               </a:rPr>
-              <a:t>.</a:t>
-            </a:r>
+              <a:t>이동할겁니다</a:t>
+            </a:r>
+            <a:endParaRPr lang="en-US" altLang="ko-KR" dirty="0">
+              <a:solidFill>
+                <a:schemeClr val="tx1">
+                  <a:lumMod val="65000"/>
+                  <a:lumOff val="35000"/>
+                </a:schemeClr>
+              </a:solidFill>
+            </a:endParaRPr>
           </a:p>
           <a:p>
             <a:pPr lvl="1"/>
@@ -5628,25 +5653,6 @@
               </a:rPr>
               <a:t>했다면 아래의 창이 뜹니다</a:t>
             </a:r>
-            <a:r>
-              <a:rPr lang="en-US" altLang="ko-KR" dirty="0">
-                <a:solidFill>
-                  <a:schemeClr val="tx1">
-                    <a:lumMod val="65000"/>
-                    <a:lumOff val="35000"/>
-                  </a:schemeClr>
-                </a:solidFill>
-              </a:rPr>
-              <a:t>.</a:t>
-            </a:r>
-            <a:endParaRPr lang="ko-KR" altLang="en-US" dirty="0">
-              <a:solidFill>
-                <a:schemeClr val="tx1">
-                  <a:lumMod val="65000"/>
-                  <a:lumOff val="35000"/>
-                </a:schemeClr>
-              </a:solidFill>
-            </a:endParaRPr>
           </a:p>
         </p:txBody>
       </p:sp>
@@ -5915,7 +5921,7 @@
                   </a:schemeClr>
                 </a:solidFill>
               </a:rPr>
-              <a:t>. (</a:t>
+              <a:t> (</a:t>
             </a:r>
             <a:r>
               <a:rPr lang="ko-KR" altLang="en-US" dirty="0">
@@ -5937,7 +5943,7 @@
                   </a:schemeClr>
                 </a:solidFill>
               </a:rPr>
-              <a:t>.)</a:t>
+              <a:t>)</a:t>
             </a:r>
             <a:endParaRPr lang="ko-KR" altLang="en-US" dirty="0">
               <a:solidFill>
@@ -6346,14 +6352,6 @@
           <a:lstStyle/>
           <a:p>
             <a:r>
-              <a:rPr lang="en-US" altLang="ko-KR" dirty="0" err="1">
-                <a:highlight>
-                  <a:srgbClr val="FFFF00"/>
-                </a:highlight>
-              </a:rPr>
-              <a:t>Git</a:t>
-            </a:r>
-            <a:r>
               <a:rPr lang="ko-KR" altLang="en-US" dirty="0">
                 <a:solidFill>
                   <a:schemeClr val="tx1">
@@ -6362,49 +6360,8 @@
                   </a:schemeClr>
                 </a:solidFill>
               </a:rPr>
-              <a:t>을 체크해줍니다</a:t>
-            </a:r>
-            <a:r>
-              <a:rPr lang="en-US" altLang="ko-KR" dirty="0">
-                <a:solidFill>
-                  <a:schemeClr val="tx1">
-                    <a:lumMod val="65000"/>
-                    <a:lumOff val="35000"/>
-                  </a:schemeClr>
-                </a:solidFill>
-              </a:rPr>
-              <a:t>. (</a:t>
-            </a:r>
-            <a:r>
-              <a:rPr lang="ko-KR" altLang="en-US" dirty="0">
-                <a:solidFill>
-                  <a:schemeClr val="tx1">
-                    <a:lumMod val="65000"/>
-                    <a:lumOff val="35000"/>
-                  </a:schemeClr>
-                </a:solidFill>
-              </a:rPr>
-              <a:t>저는 이미 깔려있어서 비활성화된 듯 합니다</a:t>
-            </a:r>
-            <a:r>
-              <a:rPr lang="en-US" altLang="ko-KR" dirty="0">
-                <a:solidFill>
-                  <a:schemeClr val="tx1">
-                    <a:lumMod val="65000"/>
-                    <a:lumOff val="35000"/>
-                  </a:schemeClr>
-                </a:solidFill>
-              </a:rPr>
-              <a:t>.)</a:t>
-            </a:r>
-            <a:endParaRPr lang="ko-KR" altLang="en-US" dirty="0">
-              <a:solidFill>
-                <a:schemeClr val="tx1">
-                  <a:lumMod val="65000"/>
-                  <a:lumOff val="35000"/>
-                </a:schemeClr>
-              </a:solidFill>
-            </a:endParaRPr>
+              <a:t>내가 사용할 이름과 이메일을 입력합니다</a:t>
+            </a:r>
           </a:p>
         </p:txBody>
       </p:sp>

</xml_diff>